<commit_message>
references added to ppt
</commit_message>
<xml_diff>
--- a/IT354_Project_Presentation.pptx
+++ b/IT354_Project_Presentation.pptx
@@ -11,7 +11,8 @@
     <p:sldId id="261" r:id="rId5"/>
     <p:sldId id="262" r:id="rId6"/>
     <p:sldId id="264" r:id="rId7"/>
-    <p:sldId id="265" r:id="rId8"/>
+    <p:sldId id="267" r:id="rId8"/>
+    <p:sldId id="266" r:id="rId9"/>
   </p:sldIdLst>
   <p:sldSz cx="12192000" cy="6858000"/>
   <p:notesSz cx="6858000" cy="9144000"/>
@@ -112,7 +113,18 @@
   </p:defaultTextStyle>
   <p:extLst>
     <p:ext uri="{EFAFB233-063F-42B5-8137-9DF3F51BA10A}">
-      <p15:sldGuideLst xmlns="" xmlns:p15="http://schemas.microsoft.com/office/powerpoint/2012/main"/>
+      <p15:sldGuideLst xmlns:p15="http://schemas.microsoft.com/office/powerpoint/2012/main">
+        <p15:guide id="1" orient="horz" pos="2160">
+          <p15:clr>
+            <a:srgbClr val="A4A3A4"/>
+          </p15:clr>
+        </p15:guide>
+        <p15:guide id="2" pos="3840">
+          <p15:clr>
+            <a:srgbClr val="A4A3A4"/>
+          </p15:clr>
+        </p15:guide>
+      </p15:sldGuideLst>
     </p:ext>
   </p:extLst>
 </p:presentation>
@@ -310,7 +322,7 @@
             <a:fld id="{B61BEF0D-F0BB-DE4B-95CE-6DB70DBA9567}" type="datetimeFigureOut">
               <a:rPr lang="en-US" dirty="0"/>
               <a:pPr/>
-              <a:t>5/1/15</a:t>
+              <a:t>5/1/2015</a:t>
             </a:fld>
             <a:endParaRPr lang="en-US" dirty="0"/>
           </a:p>
@@ -743,7 +755,7 @@
             <a:fld id="{B61BEF0D-F0BB-DE4B-95CE-6DB70DBA9567}" type="datetimeFigureOut">
               <a:rPr lang="en-US" dirty="0"/>
               <a:pPr/>
-              <a:t>5/1/15</a:t>
+              <a:t>5/1/2015</a:t>
             </a:fld>
             <a:endParaRPr lang="en-US" dirty="0"/>
           </a:p>
@@ -990,7 +1002,7 @@
             <a:fld id="{B61BEF0D-F0BB-DE4B-95CE-6DB70DBA9567}" type="datetimeFigureOut">
               <a:rPr lang="en-US" dirty="0"/>
               <a:pPr/>
-              <a:t>5/1/15</a:t>
+              <a:t>5/1/2015</a:t>
             </a:fld>
             <a:endParaRPr lang="en-US" dirty="0"/>
           </a:p>
@@ -1295,7 +1307,7 @@
             <a:fld id="{B61BEF0D-F0BB-DE4B-95CE-6DB70DBA9567}" type="datetimeFigureOut">
               <a:rPr lang="en-US" dirty="0"/>
               <a:pPr/>
-              <a:t>5/1/15</a:t>
+              <a:t>5/1/2015</a:t>
             </a:fld>
             <a:endParaRPr lang="en-US" dirty="0"/>
           </a:p>
@@ -1610,7 +1622,7 @@
             <a:fld id="{B61BEF0D-F0BB-DE4B-95CE-6DB70DBA9567}" type="datetimeFigureOut">
               <a:rPr lang="en-US" dirty="0"/>
               <a:pPr/>
-              <a:t>5/1/15</a:t>
+              <a:t>5/1/2015</a:t>
             </a:fld>
             <a:endParaRPr lang="en-US" dirty="0"/>
           </a:p>
@@ -1909,7 +1921,7 @@
             <a:fld id="{B61BEF0D-F0BB-DE4B-95CE-6DB70DBA9567}" type="datetimeFigureOut">
               <a:rPr lang="en-US" dirty="0"/>
               <a:pPr/>
-              <a:t>5/1/15</a:t>
+              <a:t>5/1/2015</a:t>
             </a:fld>
             <a:endParaRPr lang="en-US" dirty="0"/>
           </a:p>
@@ -2273,7 +2285,7 @@
             <a:fld id="{B61BEF0D-F0BB-DE4B-95CE-6DB70DBA9567}" type="datetimeFigureOut">
               <a:rPr lang="en-US" dirty="0"/>
               <a:pPr/>
-              <a:t>5/1/15</a:t>
+              <a:t>5/1/2015</a:t>
             </a:fld>
             <a:endParaRPr lang="en-US" dirty="0"/>
           </a:p>
@@ -2444,7 +2456,7 @@
             <a:fld id="{B61BEF0D-F0BB-DE4B-95CE-6DB70DBA9567}" type="datetimeFigureOut">
               <a:rPr lang="en-US" dirty="0"/>
               <a:pPr/>
-              <a:t>5/1/15</a:t>
+              <a:t>5/1/2015</a:t>
             </a:fld>
             <a:endParaRPr lang="en-US" dirty="0"/>
           </a:p>
@@ -2621,7 +2633,7 @@
             <a:fld id="{B61BEF0D-F0BB-DE4B-95CE-6DB70DBA9567}" type="datetimeFigureOut">
               <a:rPr lang="en-US" dirty="0"/>
               <a:pPr/>
-              <a:t>5/1/15</a:t>
+              <a:t>5/1/2015</a:t>
             </a:fld>
             <a:endParaRPr lang="en-US" dirty="0"/>
           </a:p>
@@ -2788,7 +2800,7 @@
             <a:fld id="{B61BEF0D-F0BB-DE4B-95CE-6DB70DBA9567}" type="datetimeFigureOut">
               <a:rPr lang="en-US" dirty="0"/>
               <a:pPr/>
-              <a:t>5/1/15</a:t>
+              <a:t>5/1/2015</a:t>
             </a:fld>
             <a:endParaRPr lang="en-US" dirty="0"/>
           </a:p>
@@ -3035,7 +3047,7 @@
             <a:fld id="{B61BEF0D-F0BB-DE4B-95CE-6DB70DBA9567}" type="datetimeFigureOut">
               <a:rPr lang="en-US" dirty="0"/>
               <a:pPr/>
-              <a:t>5/1/15</a:t>
+              <a:t>5/1/2015</a:t>
             </a:fld>
             <a:endParaRPr lang="en-US" dirty="0"/>
           </a:p>
@@ -3268,7 +3280,7 @@
             <a:fld id="{B61BEF0D-F0BB-DE4B-95CE-6DB70DBA9567}" type="datetimeFigureOut">
               <a:rPr lang="en-US" dirty="0"/>
               <a:pPr/>
-              <a:t>5/1/15</a:t>
+              <a:t>5/1/2015</a:t>
             </a:fld>
             <a:endParaRPr lang="en-US" dirty="0"/>
           </a:p>
@@ -3647,7 +3659,7 @@
             <a:fld id="{B61BEF0D-F0BB-DE4B-95CE-6DB70DBA9567}" type="datetimeFigureOut">
               <a:rPr lang="en-US" dirty="0"/>
               <a:pPr/>
-              <a:t>5/1/15</a:t>
+              <a:t>5/1/2015</a:t>
             </a:fld>
             <a:endParaRPr lang="en-US" dirty="0"/>
           </a:p>
@@ -3762,7 +3774,7 @@
             <a:fld id="{B61BEF0D-F0BB-DE4B-95CE-6DB70DBA9567}" type="datetimeFigureOut">
               <a:rPr lang="en-US" dirty="0"/>
               <a:pPr/>
-              <a:t>5/1/15</a:t>
+              <a:t>5/1/2015</a:t>
             </a:fld>
             <a:endParaRPr lang="en-US" dirty="0"/>
           </a:p>
@@ -3854,7 +3866,7 @@
             <a:fld id="{B61BEF0D-F0BB-DE4B-95CE-6DB70DBA9567}" type="datetimeFigureOut">
               <a:rPr lang="en-US" dirty="0"/>
               <a:pPr/>
-              <a:t>5/1/15</a:t>
+              <a:t>5/1/2015</a:t>
             </a:fld>
             <a:endParaRPr lang="en-US" dirty="0"/>
           </a:p>
@@ -4106,7 +4118,7 @@
             <a:fld id="{B61BEF0D-F0BB-DE4B-95CE-6DB70DBA9567}" type="datetimeFigureOut">
               <a:rPr lang="en-US" dirty="0"/>
               <a:pPr/>
-              <a:t>5/1/15</a:t>
+              <a:t>5/1/2015</a:t>
             </a:fld>
             <a:endParaRPr lang="en-US" dirty="0"/>
           </a:p>
@@ -4386,7 +4398,7 @@
             <a:fld id="{B61BEF0D-F0BB-DE4B-95CE-6DB70DBA9567}" type="datetimeFigureOut">
               <a:rPr lang="en-US" dirty="0"/>
               <a:pPr/>
-              <a:t>5/1/15</a:t>
+              <a:t>5/1/2015</a:t>
             </a:fld>
             <a:endParaRPr lang="en-US" dirty="0"/>
           </a:p>
@@ -4789,7 +4801,7 @@
             <a:fld id="{B61BEF0D-F0BB-DE4B-95CE-6DB70DBA9567}" type="datetimeFigureOut">
               <a:rPr lang="en-US" dirty="0"/>
               <a:pPr/>
-              <a:t>5/1/15</a:t>
+              <a:t>5/1/2015</a:t>
             </a:fld>
             <a:endParaRPr lang="en-US" dirty="0"/>
           </a:p>
@@ -5403,7 +5415,7 @@
   <p:timing>
     <p:tnLst>
       <p:par>
-        <p:cTn xmlns:p14="http://schemas.microsoft.com/office/powerpoint/2010/main" id="1" dur="indefinite" restart="never" nodeType="tmRoot">
+        <p:cTn id="1" dur="indefinite" restart="never" nodeType="tmRoot">
           <p:childTnLst>
             <p:seq concurrent="1" nextAc="seek">
               <p:cTn id="2" dur="indefinite" nodeType="mainSeq">
@@ -5987,7 +5999,7 @@
   <p:timing>
     <p:tnLst>
       <p:par>
-        <p:cTn xmlns:p14="http://schemas.microsoft.com/office/powerpoint/2010/main" id="1" dur="indefinite" restart="never" nodeType="tmRoot"/>
+        <p:cTn id="1" dur="indefinite" restart="never" nodeType="tmRoot"/>
       </p:par>
     </p:tnLst>
   </p:timing>
@@ -6195,7 +6207,7 @@
   <p:timing>
     <p:tnLst>
       <p:par>
-        <p:cTn xmlns:p14="http://schemas.microsoft.com/office/powerpoint/2010/main" id="1" dur="indefinite" restart="never" nodeType="tmRoot"/>
+        <p:cTn id="1" dur="indefinite" restart="never" nodeType="tmRoot"/>
       </p:par>
     </p:tnLst>
   </p:timing>
@@ -6573,7 +6585,7 @@
   <p:timing>
     <p:tnLst>
       <p:par>
-        <p:cTn xmlns:p14="http://schemas.microsoft.com/office/powerpoint/2010/main" id="1" dur="indefinite" restart="never" nodeType="tmRoot"/>
+        <p:cTn id="1" dur="indefinite" restart="never" nodeType="tmRoot"/>
       </p:par>
     </p:tnLst>
   </p:timing>
@@ -6760,7 +6772,7 @@
   <p:timing>
     <p:tnLst>
       <p:par>
-        <p:cTn xmlns:p14="http://schemas.microsoft.com/office/powerpoint/2010/main" id="1" dur="indefinite" restart="never" nodeType="tmRoot"/>
+        <p:cTn id="1" dur="indefinite" restart="never" nodeType="tmRoot"/>
       </p:par>
     </p:tnLst>
   </p:timing>
@@ -6994,7 +7006,7 @@
   <p:timing>
     <p:tnLst>
       <p:par>
-        <p:cTn xmlns:p14="http://schemas.microsoft.com/office/powerpoint/2010/main" id="1" dur="indefinite" restart="never" nodeType="tmRoot"/>
+        <p:cTn id="1" dur="indefinite" restart="never" nodeType="tmRoot"/>
       </p:par>
     </p:tnLst>
   </p:timing>
@@ -7030,27 +7042,204 @@
         </p:nvSpPr>
         <p:spPr>
           <a:xfrm>
-            <a:off x="1818746" y="2302932"/>
-            <a:ext cx="8534400" cy="1507067"/>
+            <a:off x="684212" y="-27725"/>
+            <a:ext cx="8534400" cy="1094525"/>
           </a:xfrm>
         </p:spPr>
         <p:txBody>
           <a:bodyPr/>
           <a:lstStyle/>
           <a:p>
-            <a:pPr algn="ctr"/>
             <a:r>
               <a:rPr lang="en-US" dirty="0" smtClean="0"/>
-              <a:t>Thank You!!</a:t>
-            </a:r>
-            <a:endParaRPr lang="en-US" dirty="0"/>
+              <a:t>References</a:t>
+            </a:r>
+            <a:endParaRPr lang="en-US" dirty="0"/>
+          </a:p>
+        </p:txBody>
+      </p:sp>
+      <p:sp>
+        <p:nvSpPr>
+          <p:cNvPr id="3" name="Content Placeholder 2"/>
+          <p:cNvSpPr>
+            <a:spLocks noGrp="1"/>
+          </p:cNvSpPr>
+          <p:nvPr>
+            <p:ph idx="1"/>
+          </p:nvPr>
+        </p:nvSpPr>
+        <p:spPr>
+          <a:xfrm>
+            <a:off x="684212" y="1066800"/>
+            <a:ext cx="8739188" cy="4921876"/>
+          </a:xfrm>
+        </p:spPr>
+        <p:txBody>
+          <a:bodyPr>
+            <a:normAutofit/>
+          </a:bodyPr>
+          <a:lstStyle/>
+          <a:p>
+            <a:pPr lvl="0" algn="just">
+              <a:buClr>
+                <a:prstClr val="white"/>
+              </a:buClr>
+            </a:pPr>
+            <a:r>
+              <a:rPr lang="en-US" altLang="en-US" sz="1900" b="1" dirty="0" smtClean="0">
+                <a:solidFill>
+                  <a:srgbClr val="146194">
+                    <a:lumMod val="75000"/>
+                  </a:srgbClr>
+                </a:solidFill>
+                <a:hlinkClick r:id="rId2"/>
+              </a:rPr>
+              <a:t>http</a:t>
+            </a:r>
+            <a:r>
+              <a:rPr lang="en-US" altLang="en-US" sz="1900" b="1" dirty="0">
+                <a:solidFill>
+                  <a:srgbClr val="146194">
+                    <a:lumMod val="75000"/>
+                  </a:srgbClr>
+                </a:solidFill>
+                <a:hlinkClick r:id="rId2"/>
+              </a:rPr>
+              <a:t>://</a:t>
+            </a:r>
+            <a:r>
+              <a:rPr lang="en-US" altLang="en-US" sz="1900" b="1" dirty="0" smtClean="0">
+                <a:solidFill>
+                  <a:srgbClr val="146194">
+                    <a:lumMod val="75000"/>
+                  </a:srgbClr>
+                </a:solidFill>
+                <a:hlinkClick r:id="rId2"/>
+              </a:rPr>
+              <a:t>phonegap.com</a:t>
+            </a:r>
+            <a:endParaRPr lang="en-US" altLang="en-US" sz="1700" b="1" dirty="0">
+              <a:solidFill>
+                <a:srgbClr val="146194">
+                  <a:lumMod val="75000"/>
+                </a:srgbClr>
+              </a:solidFill>
+            </a:endParaRPr>
+          </a:p>
+          <a:p>
+            <a:pPr lvl="0" algn="just">
+              <a:buClr>
+                <a:prstClr val="white"/>
+              </a:buClr>
+            </a:pPr>
+            <a:r>
+              <a:rPr lang="en-US" altLang="en-US" sz="1900" b="1" dirty="0">
+                <a:solidFill>
+                  <a:srgbClr val="146194">
+                    <a:lumMod val="75000"/>
+                  </a:srgbClr>
+                </a:solidFill>
+                <a:hlinkClick r:id="rId3"/>
+              </a:rPr>
+              <a:t>http</a:t>
+            </a:r>
+            <a:r>
+              <a:rPr lang="en-US" altLang="en-US" sz="1900" b="1" dirty="0" smtClean="0">
+                <a:solidFill>
+                  <a:srgbClr val="146194">
+                    <a:lumMod val="75000"/>
+                  </a:srgbClr>
+                </a:solidFill>
+                <a:hlinkClick r:id="rId3"/>
+              </a:rPr>
+              <a:t>://www.programmableweb.com</a:t>
+            </a:r>
+            <a:endParaRPr lang="en-US" altLang="en-US" sz="1900" b="1" dirty="0" smtClean="0">
+              <a:solidFill>
+                <a:srgbClr val="146194">
+                  <a:lumMod val="75000"/>
+                </a:srgbClr>
+              </a:solidFill>
+            </a:endParaRPr>
+          </a:p>
+          <a:p>
+            <a:pPr lvl="0" algn="just">
+              <a:buClr>
+                <a:prstClr val="white"/>
+              </a:buClr>
+            </a:pPr>
+            <a:r>
+              <a:rPr lang="en-US" altLang="en-US" sz="1900" b="1" dirty="0">
+                <a:solidFill>
+                  <a:srgbClr val="146194">
+                    <a:lumMod val="75000"/>
+                  </a:srgbClr>
+                </a:solidFill>
+                <a:hlinkClick r:id="rId4"/>
+              </a:rPr>
+              <a:t>http://</a:t>
+            </a:r>
+            <a:r>
+              <a:rPr lang="en-US" altLang="en-US" sz="1900" b="1" dirty="0" smtClean="0">
+                <a:solidFill>
+                  <a:srgbClr val="146194">
+                    <a:lumMod val="75000"/>
+                  </a:srgbClr>
+                </a:solidFill>
+                <a:hlinkClick r:id="rId4"/>
+              </a:rPr>
+              <a:t>developer.rottentomatoes.com</a:t>
+            </a:r>
+            <a:endParaRPr lang="en-US" altLang="en-US" sz="1900" b="1" dirty="0" smtClean="0">
+              <a:solidFill>
+                <a:srgbClr val="146194">
+                  <a:lumMod val="75000"/>
+                </a:srgbClr>
+              </a:solidFill>
+            </a:endParaRPr>
+          </a:p>
+          <a:p>
+            <a:pPr lvl="0" algn="just">
+              <a:buClr>
+                <a:prstClr val="white"/>
+              </a:buClr>
+            </a:pPr>
+            <a:r>
+              <a:rPr lang="en-US" altLang="en-US" sz="1900" b="1" dirty="0">
+                <a:solidFill>
+                  <a:srgbClr val="146194">
+                    <a:lumMod val="75000"/>
+                  </a:srgbClr>
+                </a:solidFill>
+                <a:hlinkClick r:id="rId5"/>
+              </a:rPr>
+              <a:t>https://</a:t>
+            </a:r>
+            <a:r>
+              <a:rPr lang="en-US" altLang="en-US" sz="1900" b="1" dirty="0" smtClean="0">
+                <a:solidFill>
+                  <a:srgbClr val="146194">
+                    <a:lumMod val="75000"/>
+                  </a:srgbClr>
+                </a:solidFill>
+                <a:hlinkClick r:id="rId5"/>
+              </a:rPr>
+              <a:t>jquerymobile.com</a:t>
+            </a:r>
+            <a:endParaRPr lang="en-US" altLang="en-US" sz="1900" b="1" dirty="0" smtClean="0">
+              <a:solidFill>
+                <a:srgbClr val="146194">
+                  <a:lumMod val="75000"/>
+                </a:srgbClr>
+              </a:solidFill>
+            </a:endParaRPr>
           </a:p>
         </p:txBody>
       </p:sp>
     </p:spTree>
     <p:extLst>
       <p:ext uri="{BB962C8B-B14F-4D97-AF65-F5344CB8AC3E}">
-        <p14:creationId xmlns:p14="http://schemas.microsoft.com/office/powerpoint/2010/main" val="3305271119"/>
+        <p14:creationId xmlns:p14="http://schemas.microsoft.com/office/powerpoint/2010/main" val="888432052"/>
       </p:ext>
     </p:extLst>
   </p:cSld>
@@ -7060,7 +7249,73 @@
   <p:timing>
     <p:tnLst>
       <p:par>
-        <p:cTn xmlns:p14="http://schemas.microsoft.com/office/powerpoint/2010/main" id="1" dur="indefinite" restart="never" nodeType="tmRoot"/>
+        <p:cTn id="1" dur="indefinite" restart="never" nodeType="tmRoot"/>
+      </p:par>
+    </p:tnLst>
+  </p:timing>
+</p:sld>
+</file>
+
+<file path=ppt/slides/slide8.xml><?xml version="1.0" encoding="utf-8"?>
+<p:sld xmlns:a="http://schemas.openxmlformats.org/drawingml/2006/main" xmlns:r="http://schemas.openxmlformats.org/officeDocument/2006/relationships" xmlns:p="http://schemas.openxmlformats.org/presentationml/2006/main">
+  <p:cSld>
+    <p:spTree>
+      <p:nvGrpSpPr>
+        <p:cNvPr id="1" name=""/>
+        <p:cNvGrpSpPr/>
+        <p:nvPr/>
+      </p:nvGrpSpPr>
+      <p:grpSpPr>
+        <a:xfrm>
+          <a:off x="0" y="0"/>
+          <a:ext cx="0" cy="0"/>
+          <a:chOff x="0" y="0"/>
+          <a:chExt cx="0" cy="0"/>
+        </a:xfrm>
+      </p:grpSpPr>
+      <p:sp>
+        <p:nvSpPr>
+          <p:cNvPr id="2" name="Title 1"/>
+          <p:cNvSpPr>
+            <a:spLocks noGrp="1"/>
+          </p:cNvSpPr>
+          <p:nvPr>
+            <p:ph type="title"/>
+          </p:nvPr>
+        </p:nvSpPr>
+        <p:spPr>
+          <a:xfrm>
+            <a:off x="1818746" y="2302932"/>
+            <a:ext cx="8534400" cy="1507067"/>
+          </a:xfrm>
+        </p:spPr>
+        <p:txBody>
+          <a:bodyPr/>
+          <a:lstStyle/>
+          <a:p>
+            <a:pPr algn="ctr"/>
+            <a:r>
+              <a:rPr lang="en-US" dirty="0" smtClean="0"/>
+              <a:t>Thank You!!</a:t>
+            </a:r>
+            <a:endParaRPr lang="en-US" dirty="0"/>
+          </a:p>
+        </p:txBody>
+      </p:sp>
+    </p:spTree>
+    <p:extLst>
+      <p:ext uri="{BB962C8B-B14F-4D97-AF65-F5344CB8AC3E}">
+        <p14:creationId xmlns:p14="http://schemas.microsoft.com/office/powerpoint/2010/main" val="525819540"/>
+      </p:ext>
+    </p:extLst>
+  </p:cSld>
+  <p:clrMapOvr>
+    <a:masterClrMapping/>
+  </p:clrMapOvr>
+  <p:timing>
+    <p:tnLst>
+      <p:par>
+        <p:cTn id="1" dur="indefinite" restart="never" nodeType="tmRoot"/>
       </p:par>
     </p:tnLst>
   </p:timing>
@@ -7335,7 +7590,7 @@
   <a:extraClrSchemeLst/>
   <a:extLst>
     <a:ext uri="{05A4C25C-085E-4340-85A3-A5531E510DB2}">
-      <thm15:themeFamily xmlns="" xmlns:thm15="http://schemas.microsoft.com/office/thememl/2012/main" name="Slice" id="{0507925B-6AC9-4358-8E18-C330545D08F8}" vid="{13FEC7C6-62A9-40C4-99D2-581AACACAA2F}"/>
+      <thm15:themeFamily xmlns:thm15="http://schemas.microsoft.com/office/thememl/2012/main" name="Slice" id="{0507925B-6AC9-4358-8E18-C330545D08F8}" vid="{13FEC7C6-62A9-40C4-99D2-581AACACAA2F}"/>
     </a:ext>
   </a:extLst>
 </a:theme>

</xml_diff>